<commit_message>
changing all references from TEO to PEO
</commit_message>
<xml_diff>
--- a/proposal/PMC/persist_wal.pptx
+++ b/proposal/PMC/persist_wal.pptx
@@ -288,7 +288,7 @@
           <a:p>
             <a:fld id="{771DE289-D312-47ED-A25F-D879B1257E4F}" type="datetimeFigureOut">
               <a:rPr lang="en-US" smtClean="0"/>
-              <a:t>7/13/2013</a:t>
+              <a:t>7/14/2013</a:t>
             </a:fld>
             <a:endParaRPr lang="en-US"/>
           </a:p>
@@ -458,7 +458,7 @@
           <a:p>
             <a:fld id="{771DE289-D312-47ED-A25F-D879B1257E4F}" type="datetimeFigureOut">
               <a:rPr lang="en-US" smtClean="0"/>
-              <a:t>7/13/2013</a:t>
+              <a:t>7/14/2013</a:t>
             </a:fld>
             <a:endParaRPr lang="en-US"/>
           </a:p>
@@ -638,7 +638,7 @@
           <a:p>
             <a:fld id="{771DE289-D312-47ED-A25F-D879B1257E4F}" type="datetimeFigureOut">
               <a:rPr lang="en-US" smtClean="0"/>
-              <a:t>7/13/2013</a:t>
+              <a:t>7/14/2013</a:t>
             </a:fld>
             <a:endParaRPr lang="en-US"/>
           </a:p>
@@ -808,7 +808,7 @@
           <a:p>
             <a:fld id="{771DE289-D312-47ED-A25F-D879B1257E4F}" type="datetimeFigureOut">
               <a:rPr lang="en-US" smtClean="0"/>
-              <a:t>7/13/2013</a:t>
+              <a:t>7/14/2013</a:t>
             </a:fld>
             <a:endParaRPr lang="en-US"/>
           </a:p>
@@ -1054,7 +1054,7 @@
           <a:p>
             <a:fld id="{771DE289-D312-47ED-A25F-D879B1257E4F}" type="datetimeFigureOut">
               <a:rPr lang="en-US" smtClean="0"/>
-              <a:t>7/13/2013</a:t>
+              <a:t>7/14/2013</a:t>
             </a:fld>
             <a:endParaRPr lang="en-US"/>
           </a:p>
@@ -1342,7 +1342,7 @@
           <a:p>
             <a:fld id="{771DE289-D312-47ED-A25F-D879B1257E4F}" type="datetimeFigureOut">
               <a:rPr lang="en-US" smtClean="0"/>
-              <a:t>7/13/2013</a:t>
+              <a:t>7/14/2013</a:t>
             </a:fld>
             <a:endParaRPr lang="en-US"/>
           </a:p>
@@ -1764,7 +1764,7 @@
           <a:p>
             <a:fld id="{771DE289-D312-47ED-A25F-D879B1257E4F}" type="datetimeFigureOut">
               <a:rPr lang="en-US" smtClean="0"/>
-              <a:t>7/13/2013</a:t>
+              <a:t>7/14/2013</a:t>
             </a:fld>
             <a:endParaRPr lang="en-US"/>
           </a:p>
@@ -1882,7 +1882,7 @@
           <a:p>
             <a:fld id="{771DE289-D312-47ED-A25F-D879B1257E4F}" type="datetimeFigureOut">
               <a:rPr lang="en-US" smtClean="0"/>
-              <a:t>7/13/2013</a:t>
+              <a:t>7/14/2013</a:t>
             </a:fld>
             <a:endParaRPr lang="en-US"/>
           </a:p>
@@ -1977,7 +1977,7 @@
           <a:p>
             <a:fld id="{771DE289-D312-47ED-A25F-D879B1257E4F}" type="datetimeFigureOut">
               <a:rPr lang="en-US" smtClean="0"/>
-              <a:t>7/13/2013</a:t>
+              <a:t>7/14/2013</a:t>
             </a:fld>
             <a:endParaRPr lang="en-US"/>
           </a:p>
@@ -2254,7 +2254,7 @@
           <a:p>
             <a:fld id="{771DE289-D312-47ED-A25F-D879B1257E4F}" type="datetimeFigureOut">
               <a:rPr lang="en-US" smtClean="0"/>
-              <a:t>7/13/2013</a:t>
+              <a:t>7/14/2013</a:t>
             </a:fld>
             <a:endParaRPr lang="en-US"/>
           </a:p>
@@ -2507,7 +2507,7 @@
           <a:p>
             <a:fld id="{771DE289-D312-47ED-A25F-D879B1257E4F}" type="datetimeFigureOut">
               <a:rPr lang="en-US" smtClean="0"/>
-              <a:t>7/13/2013</a:t>
+              <a:t>7/14/2013</a:t>
             </a:fld>
             <a:endParaRPr lang="en-US"/>
           </a:p>
@@ -2720,7 +2720,7 @@
           <a:p>
             <a:fld id="{771DE289-D312-47ED-A25F-D879B1257E4F}" type="datetimeFigureOut">
               <a:rPr lang="en-US" smtClean="0"/>
-              <a:t>7/13/2013</a:t>
+              <a:t>7/14/2013</a:t>
             </a:fld>
             <a:endParaRPr lang="en-US"/>
           </a:p>
@@ -3772,8 +3772,12 @@
           <a:p>
             <a:pPr algn="ctr"/>
             <a:r>
-              <a:rPr lang="en-US" sz="3600" dirty="0" smtClean="0"/>
-              <a:t>TEO</a:t>
+              <a:rPr lang="en-US" sz="3600" dirty="0"/>
+              <a:t>P</a:t>
+            </a:r>
+            <a:r>
+              <a:rPr lang="en-US" sz="3600" smtClean="0"/>
+              <a:t>EO</a:t>
             </a:r>
             <a:endParaRPr lang="en-US" sz="3600" dirty="0"/>
           </a:p>

</xml_diff>